<commit_message>
Update presentation and fourth demo
</commit_message>
<xml_diff>
--- a/JavaCC.pptx
+++ b/JavaCC.pptx
@@ -6,7 +6,7 @@
     <p:sldMasterId id="2147483699" r:id="rId5"/>
   </p:sldMasterIdLst>
   <p:notesMasterIdLst>
-    <p:notesMasterId r:id="rId29"/>
+    <p:notesMasterId r:id="rId32"/>
   </p:notesMasterIdLst>
   <p:sldIdLst>
     <p:sldId id="422" r:id="rId6"/>
@@ -29,9 +29,12 @@
     <p:sldId id="466" r:id="rId23"/>
     <p:sldId id="467" r:id="rId24"/>
     <p:sldId id="468" r:id="rId25"/>
-    <p:sldId id="462" r:id="rId26"/>
-    <p:sldId id="459" r:id="rId27"/>
-    <p:sldId id="469" r:id="rId28"/>
+    <p:sldId id="474" r:id="rId26"/>
+    <p:sldId id="475" r:id="rId27"/>
+    <p:sldId id="462" r:id="rId28"/>
+    <p:sldId id="476" r:id="rId29"/>
+    <p:sldId id="459" r:id="rId30"/>
+    <p:sldId id="469" r:id="rId31"/>
   </p:sldIdLst>
   <p:sldSz cx="12192000" cy="6858000"/>
   <p:notesSz cx="6858000" cy="9144000"/>
@@ -241,7 +244,7 @@
             <a:fld id="{0E30F462-3D01-49BC-83D3-E108ECCC3C8A}" type="datetimeFigureOut">
               <a:rPr lang="ru-RU" smtClean="0"/>
               <a:pPr/>
-              <a:t>11.02.2014</a:t>
+              <a:t>12.02.2014</a:t>
             </a:fld>
             <a:endParaRPr lang="ru-RU"/>
           </a:p>
@@ -958,7 +961,7 @@
                 </a:solidFill>
               </a:rPr>
               <a:pPr/>
-              <a:t>11.02.2014</a:t>
+              <a:t>12.02.2014</a:t>
             </a:fld>
             <a:endParaRPr lang="ru-RU">
               <a:solidFill>
@@ -1104,7 +1107,7 @@
                 </a:solidFill>
               </a:rPr>
               <a:pPr/>
-              <a:t>11.02.2014</a:t>
+              <a:t>12.02.2014</a:t>
             </a:fld>
             <a:endParaRPr lang="ru-RU">
               <a:solidFill>
@@ -1413,7 +1416,7 @@
                 </a:solidFill>
               </a:rPr>
               <a:pPr/>
-              <a:t>11.02.2014</a:t>
+              <a:t>12.02.2014</a:t>
             </a:fld>
             <a:endParaRPr lang="ru-RU">
               <a:solidFill>
@@ -1855,7 +1858,7 @@
                 </a:solidFill>
               </a:rPr>
               <a:pPr/>
-              <a:t>11.02.2014</a:t>
+              <a:t>12.02.2014</a:t>
             </a:fld>
             <a:endParaRPr lang="ru-RU">
               <a:solidFill>
@@ -1993,7 +1996,7 @@
                 </a:solidFill>
               </a:rPr>
               <a:pPr/>
-              <a:t>11.02.2014</a:t>
+              <a:t>12.02.2014</a:t>
             </a:fld>
             <a:endParaRPr lang="ru-RU">
               <a:solidFill>
@@ -2108,7 +2111,7 @@
                 </a:solidFill>
               </a:rPr>
               <a:pPr/>
-              <a:t>11.02.2014</a:t>
+              <a:t>12.02.2014</a:t>
             </a:fld>
             <a:endParaRPr lang="ru-RU">
               <a:solidFill>
@@ -2407,7 +2410,7 @@
                 </a:solidFill>
               </a:rPr>
               <a:pPr/>
-              <a:t>11.02.2014</a:t>
+              <a:t>12.02.2014</a:t>
             </a:fld>
             <a:endParaRPr lang="ru-RU">
               <a:solidFill>
@@ -2680,7 +2683,7 @@
                 </a:solidFill>
               </a:rPr>
               <a:pPr/>
-              <a:t>11.02.2014</a:t>
+              <a:t>12.02.2014</a:t>
             </a:fld>
             <a:endParaRPr lang="ru-RU">
               <a:solidFill>
@@ -2825,7 +2828,7 @@
                 </a:solidFill>
               </a:rPr>
               <a:pPr/>
-              <a:t>11.02.2014</a:t>
+              <a:t>12.02.2014</a:t>
             </a:fld>
             <a:endParaRPr lang="ru-RU" dirty="0">
               <a:solidFill>
@@ -3096,7 +3099,7 @@
                 </a:solidFill>
               </a:rPr>
               <a:pPr/>
-              <a:t>11.02.2014</a:t>
+              <a:t>12.02.2014</a:t>
             </a:fld>
             <a:endParaRPr lang="ru-RU" dirty="0">
               <a:solidFill>
@@ -3706,7 +3709,7 @@
                 </a:solidFill>
               </a:rPr>
               <a:pPr/>
-              <a:t>11.02.2014</a:t>
+              <a:t>12.02.2014</a:t>
             </a:fld>
             <a:endParaRPr lang="ru-RU" dirty="0">
               <a:solidFill>
@@ -4660,6 +4663,18 @@
               <a:buNone/>
             </a:pPr>
             <a:r>
+              <a:rPr lang="en-US" dirty="0" smtClean="0"/>
+              <a:t>Java –</a:t>
+            </a:r>
+            <a:r>
+              <a:rPr lang="en-US" dirty="0" err="1" smtClean="0"/>
+              <a:t>cp</a:t>
+            </a:r>
+            <a:r>
+              <a:rPr lang="en-US" dirty="0" smtClean="0"/>
+              <a:t> javacc.jar </a:t>
+            </a:r>
+            <a:r>
               <a:rPr lang="en-US" dirty="0" err="1" smtClean="0"/>
               <a:t>javacc</a:t>
             </a:r>
@@ -7610,7 +7625,7 @@
       </p:grpSpPr>
       <p:sp>
         <p:nvSpPr>
-          <p:cNvPr id="2" name="Заголовок 1"/>
+          <p:cNvPr id="2" name="Title 1"/>
           <p:cNvSpPr>
             <a:spLocks noGrp="1"/>
           </p:cNvSpPr>
@@ -7624,20 +7639,801 @@
           <a:lstStyle/>
           <a:p>
             <a:r>
-              <a:rPr lang="ru-RU" dirty="0" smtClean="0"/>
-              <a:t>Пример </a:t>
+              <a:rPr lang="en-US" dirty="0" err="1" smtClean="0"/>
+              <a:t>JJTree</a:t>
+            </a:r>
+            <a:endParaRPr lang="ru-RU" dirty="0"/>
+          </a:p>
+        </p:txBody>
+      </p:sp>
+      <p:sp>
+        <p:nvSpPr>
+          <p:cNvPr id="3" name="Content Placeholder 2"/>
+          <p:cNvSpPr>
+            <a:spLocks noGrp="1"/>
+          </p:cNvSpPr>
+          <p:nvPr>
+            <p:ph sz="half" idx="1"/>
+          </p:nvPr>
+        </p:nvSpPr>
+        <p:spPr>
+          <a:xfrm>
+            <a:off x="609600" y="1196753"/>
+            <a:ext cx="11391056" cy="4929412"/>
+          </a:xfrm>
+        </p:spPr>
+        <p:txBody>
+          <a:bodyPr/>
+          <a:lstStyle/>
+          <a:p>
+            <a:r>
+              <a:rPr lang="en-US" dirty="0" err="1" smtClean="0"/>
+              <a:t>JJTree</a:t>
+            </a:r>
+            <a:r>
+              <a:rPr lang="en-US" dirty="0" smtClean="0"/>
+              <a:t> – </a:t>
+            </a:r>
+            <a:r>
+              <a:rPr lang="ru-RU" dirty="0" smtClean="0"/>
+              <a:t>это инструмент, являющийся частью </a:t>
             </a:r>
             <a:r>
               <a:rPr lang="en-US" dirty="0" err="1" smtClean="0"/>
               <a:t>JavaCC</a:t>
             </a:r>
             <a:r>
+              <a:rPr lang="ru-RU" dirty="0" smtClean="0"/>
+              <a:t>, который позволяет удобно и быстро строить синтаксические деревья.</a:t>
+            </a:r>
+          </a:p>
+          <a:p>
+            <a:r>
+              <a:rPr lang="ru-RU" dirty="0" smtClean="0"/>
+              <a:t>Простой </a:t>
+            </a:r>
+            <a:r>
+              <a:rPr lang="ru-RU" dirty="0" err="1" smtClean="0"/>
+              <a:t>парсер</a:t>
+            </a:r>
+            <a:r>
+              <a:rPr lang="ru-RU" dirty="0" smtClean="0"/>
+              <a:t> без действий в </a:t>
+            </a:r>
+            <a:r>
+              <a:rPr lang="en-US" dirty="0" err="1" smtClean="0"/>
+              <a:t>jj</a:t>
+            </a:r>
+            <a:r>
               <a:rPr lang="en-US" dirty="0" smtClean="0"/>
               <a:t> </a:t>
             </a:r>
             <a:r>
+              <a:rPr lang="ru-RU" dirty="0" smtClean="0"/>
+              <a:t>файле умеет только проверять удовлетворяет ли входная строка грамматике или нет.</a:t>
+            </a:r>
+          </a:p>
+          <a:p>
+            <a:r>
+              <a:rPr lang="ru-RU" dirty="0" smtClean="0"/>
+              <a:t>Чтобы добавить этап построения синтаксического дерева нужно:</a:t>
+            </a:r>
+          </a:p>
+          <a:p>
+            <a:pPr lvl="1"/>
+            <a:r>
+              <a:rPr lang="ru-RU" dirty="0" smtClean="0"/>
+              <a:t>Изменить расширение файла с </a:t>
+            </a:r>
+            <a:r>
+              <a:rPr lang="en-US" dirty="0" err="1" smtClean="0"/>
+              <a:t>jj</a:t>
+            </a:r>
+            <a:r>
+              <a:rPr lang="ru-RU" dirty="0" smtClean="0"/>
+              <a:t> на </a:t>
+            </a:r>
+            <a:r>
+              <a:rPr lang="en-US" dirty="0" err="1" smtClean="0"/>
+              <a:t>jjt</a:t>
+            </a:r>
+            <a:endParaRPr lang="en-US" dirty="0" smtClean="0"/>
+          </a:p>
+          <a:p>
+            <a:pPr lvl="1"/>
+            <a:r>
+              <a:rPr lang="ru-RU" dirty="0" smtClean="0"/>
+              <a:t>Сгенерировать </a:t>
+            </a:r>
+            <a:r>
+              <a:rPr lang="en-US" dirty="0" err="1" smtClean="0"/>
+              <a:t>jj</a:t>
+            </a:r>
+            <a:r>
+              <a:rPr lang="en-US" dirty="0" smtClean="0"/>
+              <a:t> </a:t>
+            </a:r>
+            <a:r>
+              <a:rPr lang="ru-RU" dirty="0" smtClean="0"/>
+              <a:t>файл командой </a:t>
+            </a:r>
+            <a:r>
+              <a:rPr lang="en-US" dirty="0" smtClean="0">
+                <a:solidFill>
+                  <a:srgbClr val="FF0000"/>
+                </a:solidFill>
+              </a:rPr>
+              <a:t>java –</a:t>
+            </a:r>
+            <a:r>
+              <a:rPr lang="en-US" dirty="0" err="1" smtClean="0">
+                <a:solidFill>
+                  <a:srgbClr val="FF0000"/>
+                </a:solidFill>
+              </a:rPr>
+              <a:t>cp</a:t>
+            </a:r>
+            <a:r>
+              <a:rPr lang="en-US" dirty="0" smtClean="0">
+                <a:solidFill>
+                  <a:srgbClr val="FF0000"/>
+                </a:solidFill>
+              </a:rPr>
+              <a:t> javacc.jar </a:t>
+            </a:r>
+            <a:r>
+              <a:rPr lang="en-US" dirty="0" err="1" smtClean="0">
+                <a:solidFill>
+                  <a:srgbClr val="FF0000"/>
+                </a:solidFill>
+              </a:rPr>
+              <a:t>jjtree</a:t>
+            </a:r>
+            <a:r>
+              <a:rPr lang="en-US" dirty="0" smtClean="0">
+                <a:solidFill>
+                  <a:srgbClr val="FF0000"/>
+                </a:solidFill>
+              </a:rPr>
+              <a:t> </a:t>
+            </a:r>
+            <a:r>
+              <a:rPr lang="ru-RU" dirty="0" err="1" smtClean="0">
+                <a:solidFill>
+                  <a:srgbClr val="FF0000"/>
+                </a:solidFill>
+              </a:rPr>
+              <a:t>имя_файла</a:t>
+            </a:r>
+            <a:r>
+              <a:rPr lang="en-US" dirty="0" smtClean="0">
+                <a:solidFill>
+                  <a:srgbClr val="FF0000"/>
+                </a:solidFill>
+              </a:rPr>
+              <a:t>.</a:t>
+            </a:r>
+            <a:r>
+              <a:rPr lang="en-US" dirty="0" err="1" smtClean="0">
+                <a:solidFill>
+                  <a:srgbClr val="FF0000"/>
+                </a:solidFill>
+              </a:rPr>
+              <a:t>jjt</a:t>
+            </a:r>
+            <a:endParaRPr lang="en-US" dirty="0" smtClean="0">
+              <a:solidFill>
+                <a:srgbClr val="FF0000"/>
+              </a:solidFill>
+            </a:endParaRPr>
+          </a:p>
+          <a:p>
+            <a:pPr lvl="1"/>
+            <a:r>
+              <a:rPr lang="ru-RU" dirty="0" smtClean="0"/>
+              <a:t>Сгенерировать </a:t>
+            </a:r>
+            <a:r>
               <a:rPr lang="ru-RU" dirty="0" err="1" smtClean="0"/>
-              <a:t>парсера</a:t>
+              <a:t>парсер</a:t>
+            </a:r>
+            <a:r>
+              <a:rPr lang="ru-RU" dirty="0" smtClean="0"/>
+              <a:t> командой </a:t>
+            </a:r>
+            <a:r>
+              <a:rPr lang="en-US" dirty="0">
+                <a:solidFill>
+                  <a:srgbClr val="FF0000"/>
+                </a:solidFill>
+              </a:rPr>
+              <a:t>java –</a:t>
+            </a:r>
+            <a:r>
+              <a:rPr lang="en-US" dirty="0" err="1">
+                <a:solidFill>
+                  <a:srgbClr val="FF0000"/>
+                </a:solidFill>
+              </a:rPr>
+              <a:t>cp</a:t>
+            </a:r>
+            <a:r>
+              <a:rPr lang="en-US" dirty="0">
+                <a:solidFill>
+                  <a:srgbClr val="FF0000"/>
+                </a:solidFill>
+              </a:rPr>
+              <a:t> javacc.jar </a:t>
+            </a:r>
+            <a:r>
+              <a:rPr lang="en-US" dirty="0" err="1" smtClean="0">
+                <a:solidFill>
+                  <a:srgbClr val="FF0000"/>
+                </a:solidFill>
+              </a:rPr>
+              <a:t>javacc</a:t>
+            </a:r>
+            <a:r>
+              <a:rPr lang="en-US" dirty="0" smtClean="0">
+                <a:solidFill>
+                  <a:srgbClr val="FF0000"/>
+                </a:solidFill>
+              </a:rPr>
+              <a:t> </a:t>
+            </a:r>
+            <a:r>
+              <a:rPr lang="ru-RU" dirty="0" err="1" smtClean="0">
+                <a:solidFill>
+                  <a:srgbClr val="FF0000"/>
+                </a:solidFill>
+              </a:rPr>
+              <a:t>имя_файла</a:t>
+            </a:r>
+            <a:r>
+              <a:rPr lang="en-US" dirty="0" smtClean="0">
+                <a:solidFill>
+                  <a:srgbClr val="FF0000"/>
+                </a:solidFill>
+              </a:rPr>
+              <a:t>.</a:t>
+            </a:r>
+            <a:r>
+              <a:rPr lang="en-US" dirty="0" err="1" smtClean="0">
+                <a:solidFill>
+                  <a:srgbClr val="FF0000"/>
+                </a:solidFill>
+              </a:rPr>
+              <a:t>jj</a:t>
+            </a:r>
+            <a:endParaRPr lang="en-US" dirty="0">
+              <a:solidFill>
+                <a:srgbClr val="FF0000"/>
+              </a:solidFill>
+            </a:endParaRPr>
+          </a:p>
+          <a:p>
+            <a:pPr lvl="1"/>
+            <a:endParaRPr lang="en-US" dirty="0" smtClean="0"/>
+          </a:p>
+          <a:p>
+            <a:pPr lvl="1"/>
+            <a:endParaRPr lang="ru-RU" dirty="0"/>
+          </a:p>
+        </p:txBody>
+      </p:sp>
+    </p:spTree>
+    <p:extLst>
+      <p:ext uri="{BB962C8B-B14F-4D97-AF65-F5344CB8AC3E}">
+        <p14:creationId xmlns:p14="http://schemas.microsoft.com/office/powerpoint/2010/main" val="1263147890"/>
+      </p:ext>
+    </p:extLst>
+  </p:cSld>
+  <p:clrMapOvr>
+    <a:masterClrMapping/>
+  </p:clrMapOvr>
+</p:sld>
+</file>
+
+<file path=ppt/slides/slide22.xml><?xml version="1.0" encoding="utf-8"?>
+<p:sld xmlns:a="http://schemas.openxmlformats.org/drawingml/2006/main" xmlns:r="http://schemas.openxmlformats.org/officeDocument/2006/relationships" xmlns:p="http://schemas.openxmlformats.org/presentationml/2006/main">
+  <p:cSld>
+    <p:spTree>
+      <p:nvGrpSpPr>
+        <p:cNvPr id="1" name=""/>
+        <p:cNvGrpSpPr/>
+        <p:nvPr/>
+      </p:nvGrpSpPr>
+      <p:grpSpPr>
+        <a:xfrm>
+          <a:off x="0" y="0"/>
+          <a:ext cx="0" cy="0"/>
+          <a:chOff x="0" y="0"/>
+          <a:chExt cx="0" cy="0"/>
+        </a:xfrm>
+      </p:grpSpPr>
+      <p:sp>
+        <p:nvSpPr>
+          <p:cNvPr id="2" name="Title 1"/>
+          <p:cNvSpPr>
+            <a:spLocks noGrp="1"/>
+          </p:cNvSpPr>
+          <p:nvPr>
+            <p:ph type="title"/>
+          </p:nvPr>
+        </p:nvSpPr>
+        <p:spPr/>
+        <p:txBody>
+          <a:bodyPr/>
+          <a:lstStyle/>
+          <a:p>
+            <a:r>
+              <a:rPr lang="en-US" dirty="0" err="1" smtClean="0"/>
+              <a:t>JJTree</a:t>
+            </a:r>
+            <a:r>
+              <a:rPr lang="en-US" dirty="0" smtClean="0"/>
+              <a:t> </a:t>
+            </a:r>
+            <a:endParaRPr lang="ru-RU" dirty="0"/>
+          </a:p>
+        </p:txBody>
+      </p:sp>
+      <p:sp>
+        <p:nvSpPr>
+          <p:cNvPr id="3" name="Content Placeholder 2"/>
+          <p:cNvSpPr>
+            <a:spLocks noGrp="1"/>
+          </p:cNvSpPr>
+          <p:nvPr>
+            <p:ph sz="half" idx="1"/>
+          </p:nvPr>
+        </p:nvSpPr>
+        <p:spPr>
+          <a:xfrm>
+            <a:off x="407368" y="1196753"/>
+            <a:ext cx="11305256" cy="4929412"/>
+          </a:xfrm>
+        </p:spPr>
+        <p:txBody>
+          <a:bodyPr>
+            <a:normAutofit fontScale="70000" lnSpcReduction="20000"/>
+          </a:bodyPr>
+          <a:lstStyle/>
+          <a:p>
+            <a:r>
+              <a:rPr lang="ru-RU" dirty="0" smtClean="0"/>
+              <a:t>По умолчанию </a:t>
+            </a:r>
+            <a:r>
+              <a:rPr lang="en-US" dirty="0" err="1" smtClean="0"/>
+              <a:t>jjtree</a:t>
+            </a:r>
+            <a:r>
+              <a:rPr lang="en-US" dirty="0" smtClean="0"/>
+              <a:t> </a:t>
+            </a:r>
+            <a:r>
+              <a:rPr lang="ru-RU" dirty="0" smtClean="0"/>
+              <a:t>сопоставляет каждой продукции одноименную вершину. </a:t>
+            </a:r>
+          </a:p>
+          <a:p>
+            <a:r>
+              <a:rPr lang="ru-RU" dirty="0" smtClean="0"/>
+              <a:t>Чтобы сопоставить данной продукции вершину с другим именем нужно добавить </a:t>
+            </a:r>
+            <a:r>
+              <a:rPr lang="en-US" dirty="0" smtClean="0">
+                <a:solidFill>
+                  <a:srgbClr val="FF0000"/>
+                </a:solidFill>
+              </a:rPr>
+              <a:t>#</a:t>
+            </a:r>
+            <a:r>
+              <a:rPr lang="ru-RU" dirty="0" err="1" smtClean="0">
+                <a:solidFill>
+                  <a:srgbClr val="FF0000"/>
+                </a:solidFill>
+              </a:rPr>
+              <a:t>Желаемое_имя</a:t>
+            </a:r>
+            <a:r>
+              <a:rPr lang="ru-RU" dirty="0" smtClean="0"/>
+              <a:t> после описания функции, соответствующей данной продукции. Например:</a:t>
+            </a:r>
+          </a:p>
+          <a:p>
+            <a:pPr marL="0" indent="0">
+              <a:buNone/>
+            </a:pPr>
+            <a:r>
+              <a:rPr lang="ru-RU" dirty="0" smtClean="0"/>
+              <a:t>	</a:t>
+            </a:r>
+            <a:r>
+              <a:rPr lang="en-US" dirty="0"/>
+              <a:t>protected void id() </a:t>
+            </a:r>
+            <a:r>
+              <a:rPr lang="en-US" dirty="0">
+                <a:solidFill>
+                  <a:srgbClr val="FF0000"/>
+                </a:solidFill>
+              </a:rPr>
+              <a:t>#Identifier</a:t>
+            </a:r>
+            <a:r>
+              <a:rPr lang="en-US" dirty="0"/>
+              <a:t> : {} { &lt; </a:t>
+            </a:r>
+            <a:r>
+              <a:rPr lang="en-US" dirty="0" smtClean="0"/>
+              <a:t>IDENTIFIER </a:t>
+            </a:r>
+            <a:r>
+              <a:rPr lang="en-US" dirty="0"/>
+              <a:t>&gt; </a:t>
+            </a:r>
+            <a:r>
+              <a:rPr lang="en-US" dirty="0" smtClean="0"/>
+              <a:t>}</a:t>
+            </a:r>
+            <a:endParaRPr lang="ru-RU" dirty="0" smtClean="0"/>
+          </a:p>
+          <a:p>
+            <a:r>
+              <a:rPr lang="ru-RU" dirty="0" smtClean="0"/>
+              <a:t>Чтобы данная продукция не порождала вершину нужно указать</a:t>
+            </a:r>
+            <a:r>
+              <a:rPr lang="en-US" dirty="0" smtClean="0"/>
+              <a:t> </a:t>
+            </a:r>
+            <a:r>
+              <a:rPr lang="en-US" dirty="0" smtClean="0">
+                <a:solidFill>
+                  <a:srgbClr val="FF0000"/>
+                </a:solidFill>
+              </a:rPr>
+              <a:t>#void</a:t>
+            </a:r>
+            <a:r>
+              <a:rPr lang="en-US" dirty="0" smtClean="0"/>
+              <a:t>. </a:t>
+            </a:r>
+            <a:r>
+              <a:rPr lang="ru-RU" dirty="0" smtClean="0"/>
+              <a:t>Например </a:t>
+            </a:r>
+          </a:p>
+          <a:p>
+            <a:pPr marL="0" indent="0">
+              <a:buNone/>
+            </a:pPr>
+            <a:r>
+              <a:rPr lang="ru-RU" dirty="0"/>
+              <a:t>	</a:t>
+            </a:r>
+            <a:r>
+              <a:rPr lang="en-US" dirty="0"/>
+              <a:t>protected void id() </a:t>
+            </a:r>
+            <a:r>
+              <a:rPr lang="en-US" dirty="0" smtClean="0">
+                <a:solidFill>
+                  <a:srgbClr val="FF0000"/>
+                </a:solidFill>
+              </a:rPr>
+              <a:t>#void</a:t>
+            </a:r>
+            <a:r>
+              <a:rPr lang="en-US" dirty="0" smtClean="0"/>
+              <a:t>: </a:t>
+            </a:r>
+            <a:r>
+              <a:rPr lang="en-US" dirty="0"/>
+              <a:t>{} { &lt; IDENTIFIER &gt; }</a:t>
+            </a:r>
+            <a:endParaRPr lang="ru-RU" dirty="0"/>
+          </a:p>
+          <a:p>
+            <a:r>
+              <a:rPr lang="ru-RU" dirty="0" smtClean="0"/>
+              <a:t>Можно сопоставить вершину лишь части продукции:</a:t>
+            </a:r>
+          </a:p>
+          <a:p>
+            <a:pPr marL="457200" lvl="1" indent="0">
+              <a:buNone/>
+            </a:pPr>
+            <a:r>
+              <a:rPr lang="en-US" dirty="0" smtClean="0"/>
+              <a:t>	protected </a:t>
+            </a:r>
+            <a:r>
+              <a:rPr lang="en-US" dirty="0"/>
+              <a:t>void </a:t>
+            </a:r>
+            <a:r>
+              <a:rPr lang="en-US" dirty="0" err="1"/>
+              <a:t>unaryExpression</a:t>
+            </a:r>
+            <a:r>
+              <a:rPr lang="en-US" dirty="0"/>
+              <a:t>() #void : {}</a:t>
+            </a:r>
+          </a:p>
+          <a:p>
+            <a:pPr marL="457200" lvl="1" indent="0">
+              <a:buNone/>
+            </a:pPr>
+            <a:r>
+              <a:rPr lang="en-US" dirty="0" smtClean="0"/>
+              <a:t>	{ 	</a:t>
+            </a:r>
+          </a:p>
+          <a:p>
+            <a:pPr marL="457200" lvl="1" indent="0">
+              <a:buNone/>
+            </a:pPr>
+            <a:r>
+              <a:rPr lang="en-US" dirty="0"/>
+              <a:t>	</a:t>
+            </a:r>
+            <a:r>
+              <a:rPr lang="en-US" dirty="0" smtClean="0"/>
+              <a:t>	&lt; </a:t>
+            </a:r>
+            <a:r>
+              <a:rPr lang="en-US" dirty="0"/>
+              <a:t>NOT &gt; </a:t>
+            </a:r>
+            <a:r>
+              <a:rPr lang="en-US" dirty="0" err="1"/>
+              <a:t>unaryExpression</a:t>
+            </a:r>
+            <a:r>
+              <a:rPr lang="en-US" dirty="0"/>
+              <a:t>() </a:t>
+            </a:r>
+            <a:r>
+              <a:rPr lang="en-US" dirty="0">
+                <a:solidFill>
+                  <a:srgbClr val="FF0000"/>
+                </a:solidFill>
+              </a:rPr>
+              <a:t>#</a:t>
+            </a:r>
+            <a:r>
+              <a:rPr lang="en-US" dirty="0" err="1">
+                <a:solidFill>
+                  <a:srgbClr val="FF0000"/>
+                </a:solidFill>
+              </a:rPr>
+              <a:t>NotNode</a:t>
+            </a:r>
+            <a:endParaRPr lang="en-US" dirty="0">
+              <a:solidFill>
+                <a:srgbClr val="FF0000"/>
+              </a:solidFill>
+            </a:endParaRPr>
+          </a:p>
+          <a:p>
+            <a:pPr marL="457200" lvl="1" indent="0">
+              <a:buNone/>
+            </a:pPr>
+            <a:r>
+              <a:rPr lang="en-US" dirty="0" smtClean="0"/>
+              <a:t>	         | </a:t>
+            </a:r>
+            <a:r>
+              <a:rPr lang="en-US" dirty="0"/>
+              <a:t>&lt; MINUS &gt; </a:t>
+            </a:r>
+            <a:r>
+              <a:rPr lang="en-US" dirty="0" err="1"/>
+              <a:t>unaryExpression</a:t>
+            </a:r>
+            <a:r>
+              <a:rPr lang="en-US" dirty="0"/>
+              <a:t>() </a:t>
+            </a:r>
+            <a:r>
+              <a:rPr lang="en-US" dirty="0">
+                <a:solidFill>
+                  <a:srgbClr val="FF0000"/>
+                </a:solidFill>
+              </a:rPr>
+              <a:t>#</a:t>
+            </a:r>
+            <a:r>
+              <a:rPr lang="en-US" dirty="0" err="1">
+                <a:solidFill>
+                  <a:srgbClr val="FF0000"/>
+                </a:solidFill>
+              </a:rPr>
+              <a:t>UnaryMinusNode</a:t>
+            </a:r>
+            <a:endParaRPr lang="en-US" dirty="0">
+              <a:solidFill>
+                <a:srgbClr val="FF0000"/>
+              </a:solidFill>
+            </a:endParaRPr>
+          </a:p>
+          <a:p>
+            <a:pPr marL="457200" lvl="1" indent="0">
+              <a:buNone/>
+            </a:pPr>
+            <a:r>
+              <a:rPr lang="en-US" dirty="0" smtClean="0"/>
+              <a:t>	}</a:t>
+            </a:r>
+            <a:endParaRPr lang="en-US" dirty="0"/>
+          </a:p>
+          <a:p>
+            <a:r>
+              <a:rPr lang="ru-RU" dirty="0" smtClean="0"/>
+              <a:t>Внутри функций описывающих продукции можно пользоваться переменной </a:t>
+            </a:r>
+            <a:r>
+              <a:rPr lang="en-US" dirty="0" err="1" smtClean="0"/>
+              <a:t>jjThis</a:t>
+            </a:r>
+            <a:r>
+              <a:rPr lang="en-US" dirty="0" smtClean="0"/>
+              <a:t> </a:t>
+            </a:r>
+            <a:r>
+              <a:rPr lang="ru-RU" dirty="0" smtClean="0"/>
+              <a:t>(это текущую вершина). Например:</a:t>
+            </a:r>
+          </a:p>
+          <a:p>
+            <a:pPr marL="0" indent="0">
+              <a:buNone/>
+            </a:pPr>
+            <a:r>
+              <a:rPr lang="ru-RU" dirty="0" smtClean="0"/>
+              <a:t>	</a:t>
+            </a:r>
+            <a:r>
+              <a:rPr lang="en-US" dirty="0"/>
+              <a:t>protected void </a:t>
+            </a:r>
+            <a:r>
+              <a:rPr lang="en-US" dirty="0" err="1"/>
+              <a:t>stringLiteral</a:t>
+            </a:r>
+            <a:r>
+              <a:rPr lang="en-US" dirty="0"/>
+              <a:t>() #</a:t>
+            </a:r>
+            <a:r>
+              <a:rPr lang="en-US" dirty="0" err="1"/>
+              <a:t>StringLiteral</a:t>
+            </a:r>
+            <a:r>
+              <a:rPr lang="en-US" dirty="0"/>
+              <a:t> : { Token _token; }</a:t>
+            </a:r>
+          </a:p>
+          <a:p>
+            <a:pPr marL="0" indent="0">
+              <a:buNone/>
+            </a:pPr>
+            <a:r>
+              <a:rPr lang="ru-RU" dirty="0" smtClean="0"/>
+              <a:t>	</a:t>
+            </a:r>
+            <a:r>
+              <a:rPr lang="en-US" dirty="0" smtClean="0"/>
+              <a:t>{ </a:t>
+            </a:r>
+            <a:r>
+              <a:rPr lang="en-US" dirty="0"/>
+              <a:t>_token = &lt; STRING_LITERAL &gt; </a:t>
+            </a:r>
+            <a:r>
+              <a:rPr lang="en-US" dirty="0">
+                <a:solidFill>
+                  <a:srgbClr val="FF0000"/>
+                </a:solidFill>
+              </a:rPr>
+              <a:t>{ </a:t>
+            </a:r>
+            <a:r>
+              <a:rPr lang="en-US" dirty="0" err="1">
+                <a:solidFill>
+                  <a:srgbClr val="FF0000"/>
+                </a:solidFill>
+              </a:rPr>
+              <a:t>jjtThis.setValue</a:t>
+            </a:r>
+            <a:r>
+              <a:rPr lang="en-US" dirty="0">
+                <a:solidFill>
+                  <a:srgbClr val="FF0000"/>
+                </a:solidFill>
+              </a:rPr>
+              <a:t>(_</a:t>
+            </a:r>
+            <a:r>
+              <a:rPr lang="en-US" dirty="0" err="1">
+                <a:solidFill>
+                  <a:srgbClr val="FF0000"/>
+                </a:solidFill>
+              </a:rPr>
+              <a:t>token.image</a:t>
+            </a:r>
+            <a:r>
+              <a:rPr lang="en-US" dirty="0">
+                <a:solidFill>
+                  <a:srgbClr val="FF0000"/>
+                </a:solidFill>
+              </a:rPr>
+              <a:t>); } </a:t>
+            </a:r>
+            <a:r>
+              <a:rPr lang="en-US" dirty="0"/>
+              <a:t>}</a:t>
+            </a:r>
+            <a:endParaRPr lang="en-US" dirty="0" smtClean="0"/>
+          </a:p>
+        </p:txBody>
+      </p:sp>
+    </p:spTree>
+    <p:extLst>
+      <p:ext uri="{BB962C8B-B14F-4D97-AF65-F5344CB8AC3E}">
+        <p14:creationId xmlns:p14="http://schemas.microsoft.com/office/powerpoint/2010/main" val="3607450569"/>
+      </p:ext>
+    </p:extLst>
+  </p:cSld>
+  <p:clrMapOvr>
+    <a:masterClrMapping/>
+  </p:clrMapOvr>
+</p:sld>
+</file>
+
+<file path=ppt/slides/slide23.xml><?xml version="1.0" encoding="utf-8"?>
+<p:sld xmlns:a="http://schemas.openxmlformats.org/drawingml/2006/main" xmlns:r="http://schemas.openxmlformats.org/officeDocument/2006/relationships" xmlns:p="http://schemas.openxmlformats.org/presentationml/2006/main">
+  <p:cSld>
+    <p:spTree>
+      <p:nvGrpSpPr>
+        <p:cNvPr id="1" name=""/>
+        <p:cNvGrpSpPr/>
+        <p:nvPr/>
+      </p:nvGrpSpPr>
+      <p:grpSpPr>
+        <a:xfrm>
+          <a:off x="0" y="0"/>
+          <a:ext cx="0" cy="0"/>
+          <a:chOff x="0" y="0"/>
+          <a:chExt cx="0" cy="0"/>
+        </a:xfrm>
+      </p:grpSpPr>
+      <p:sp>
+        <p:nvSpPr>
+          <p:cNvPr id="2" name="Заголовок 1"/>
+          <p:cNvSpPr>
+            <a:spLocks noGrp="1"/>
+          </p:cNvSpPr>
+          <p:nvPr>
+            <p:ph type="title"/>
+          </p:nvPr>
+        </p:nvSpPr>
+        <p:spPr/>
+        <p:txBody>
+          <a:bodyPr/>
+          <a:lstStyle/>
+          <a:p>
+            <a:r>
+              <a:rPr lang="ru-RU" dirty="0" smtClean="0"/>
+              <a:t>Полезные опции </a:t>
+            </a:r>
+            <a:r>
+              <a:rPr lang="en-US" dirty="0" err="1" smtClean="0"/>
+              <a:t>JJTree</a:t>
             </a:r>
             <a:endParaRPr lang="ru-RU" dirty="0"/>
           </a:p>
@@ -7660,22 +8456,186 @@
           </a:xfrm>
         </p:spPr>
         <p:txBody>
-          <a:bodyPr/>
+          <a:bodyPr>
+            <a:normAutofit lnSpcReduction="10000"/>
+          </a:bodyPr>
           <a:lstStyle/>
           <a:p>
             <a:r>
-              <a:rPr lang="ru-RU" dirty="0" smtClean="0"/>
-              <a:t>И тут я открываю </a:t>
-            </a:r>
-            <a:r>
-              <a:rPr lang="en-US" dirty="0" smtClean="0"/>
-              <a:t>IDE</a:t>
-            </a:r>
-            <a:r>
-              <a:rPr lang="ru-RU" dirty="0" smtClean="0"/>
-              <a:t>…</a:t>
+              <a:rPr lang="en-US" dirty="0" err="1" smtClean="0"/>
+              <a:t>JJTree</a:t>
+            </a:r>
+            <a:r>
+              <a:rPr lang="en-US" dirty="0" smtClean="0"/>
+              <a:t> </a:t>
+            </a:r>
+            <a:r>
+              <a:rPr lang="ru-RU" dirty="0" smtClean="0"/>
+              <a:t>добавляет несколько новых опций</a:t>
+            </a:r>
+            <a:r>
+              <a:rPr lang="en-US" dirty="0" smtClean="0"/>
+              <a:t>, </a:t>
+            </a:r>
+            <a:r>
+              <a:rPr lang="ru-RU" dirty="0" smtClean="0"/>
+              <a:t>например:</a:t>
+            </a:r>
+          </a:p>
+          <a:p>
+            <a:pPr lvl="1"/>
+            <a:r>
+              <a:rPr lang="en-US" dirty="0"/>
+              <a:t>MULTI (default: false</a:t>
+            </a:r>
+            <a:r>
+              <a:rPr lang="en-US" dirty="0" smtClean="0"/>
+              <a:t>)</a:t>
+            </a:r>
+            <a:r>
+              <a:rPr lang="ru-RU" dirty="0" smtClean="0"/>
+              <a:t> – если </a:t>
+            </a:r>
+            <a:r>
+              <a:rPr lang="en-US" dirty="0" smtClean="0"/>
+              <a:t>true, </a:t>
+            </a:r>
+            <a:r>
+              <a:rPr lang="ru-RU" dirty="0" smtClean="0"/>
+              <a:t>то для каждой вершины будет создан свой класс.</a:t>
+            </a:r>
+          </a:p>
+          <a:p>
+            <a:pPr lvl="1"/>
+            <a:r>
+              <a:rPr lang="en-US" dirty="0"/>
+              <a:t>NODE_CLASS (default: </a:t>
+            </a:r>
+            <a:r>
+              <a:rPr lang="en-US" dirty="0" smtClean="0"/>
+              <a:t>empty) – </a:t>
+            </a:r>
+            <a:r>
+              <a:rPr lang="ru-RU" dirty="0" smtClean="0"/>
+              <a:t>если указано, то все вершины будут наследоваться от указанного класса (указанный класс должен наследоваться от </a:t>
+            </a:r>
+            <a:r>
+              <a:rPr lang="en-US" dirty="0" err="1" smtClean="0"/>
+              <a:t>SimpleNode</a:t>
+            </a:r>
+            <a:r>
+              <a:rPr lang="en-US" dirty="0" smtClean="0"/>
+              <a:t>)</a:t>
+            </a:r>
+            <a:r>
+              <a:rPr lang="ru-RU" dirty="0" smtClean="0"/>
+              <a:t>.</a:t>
+            </a:r>
+          </a:p>
+          <a:p>
+            <a:pPr lvl="1"/>
+            <a:r>
+              <a:rPr lang="en-US" dirty="0"/>
+              <a:t>BUILD_NODE_FILES (default: true</a:t>
+            </a:r>
+            <a:r>
+              <a:rPr lang="en-US" dirty="0" smtClean="0"/>
+              <a:t>)</a:t>
+            </a:r>
+            <a:r>
+              <a:rPr lang="ru-RU" dirty="0" smtClean="0"/>
+              <a:t> – если </a:t>
+            </a:r>
+            <a:r>
+              <a:rPr lang="en-US" dirty="0" smtClean="0"/>
+              <a:t>true</a:t>
+            </a:r>
+            <a:r>
+              <a:rPr lang="ru-RU" dirty="0" smtClean="0"/>
+              <a:t>, то </a:t>
+            </a:r>
+            <a:r>
+              <a:rPr lang="en-US" dirty="0" err="1" smtClean="0"/>
+              <a:t>jjtree</a:t>
+            </a:r>
+            <a:r>
+              <a:rPr lang="en-US" dirty="0" smtClean="0"/>
+              <a:t> </a:t>
+            </a:r>
+            <a:r>
+              <a:rPr lang="ru-RU" dirty="0" smtClean="0"/>
+              <a:t>создаст </a:t>
+            </a:r>
+            <a:r>
+              <a:rPr lang="en-US" dirty="0" err="1" smtClean="0"/>
+              <a:t>SimpleNode</a:t>
+            </a:r>
+            <a:r>
+              <a:rPr lang="ru-RU" dirty="0" smtClean="0"/>
+              <a:t> и другие классы для вершин.</a:t>
+            </a:r>
+            <a:endParaRPr lang="en-US" dirty="0" smtClean="0"/>
+          </a:p>
+          <a:p>
+            <a:pPr lvl="1"/>
+            <a:r>
+              <a:rPr lang="en-US" dirty="0"/>
+              <a:t>NODE_PACKAGE (default: </a:t>
+            </a:r>
+            <a:r>
+              <a:rPr lang="en-US" dirty="0" smtClean="0"/>
+              <a:t>empty) – </a:t>
+            </a:r>
+            <a:r>
+              <a:rPr lang="ru-RU" dirty="0" err="1" smtClean="0"/>
+              <a:t>пекедж</a:t>
+            </a:r>
+            <a:r>
+              <a:rPr lang="ru-RU" dirty="0" smtClean="0"/>
+              <a:t> для классов вершин. По умолчанию берется </a:t>
+            </a:r>
+            <a:r>
+              <a:rPr lang="ru-RU" dirty="0" err="1" smtClean="0"/>
+              <a:t>пекедж</a:t>
+            </a:r>
+            <a:r>
+              <a:rPr lang="ru-RU" dirty="0" smtClean="0"/>
+              <a:t> </a:t>
+            </a:r>
+            <a:r>
+              <a:rPr lang="ru-RU" dirty="0" err="1" smtClean="0"/>
+              <a:t>парсера</a:t>
+            </a:r>
+            <a:r>
+              <a:rPr lang="ru-RU" dirty="0" smtClean="0"/>
+              <a:t>.</a:t>
             </a:r>
             <a:endParaRPr lang="ru-RU" dirty="0"/>
+          </a:p>
+          <a:p>
+            <a:r>
+              <a:rPr lang="ru-RU" dirty="0" smtClean="0"/>
+              <a:t>Остальные опции тут - </a:t>
+            </a:r>
+            <a:r>
+              <a:rPr lang="en-US" dirty="0" smtClean="0">
+                <a:hlinkClick r:id="rId2"/>
+              </a:rPr>
+              <a:t>https</a:t>
+            </a:r>
+            <a:r>
+              <a:rPr lang="en-US">
+                <a:hlinkClick r:id="rId2"/>
+              </a:rPr>
+              <a:t>://</a:t>
+            </a:r>
+            <a:r>
+              <a:rPr lang="en-US" smtClean="0">
+                <a:hlinkClick r:id="rId2"/>
+              </a:rPr>
+              <a:t>javacc.java.net/doc/JJTree.html</a:t>
+            </a:r>
+            <a:endParaRPr lang="ru-RU" smtClean="0"/>
           </a:p>
         </p:txBody>
       </p:sp>
@@ -7699,7 +8659,115 @@
 </p:sld>
 </file>
 
-<file path=ppt/slides/slide22.xml><?xml version="1.0" encoding="utf-8"?>
+<file path=ppt/slides/slide24.xml><?xml version="1.0" encoding="utf-8"?>
+<p:sld xmlns:a="http://schemas.openxmlformats.org/drawingml/2006/main" xmlns:r="http://schemas.openxmlformats.org/officeDocument/2006/relationships" xmlns:p="http://schemas.openxmlformats.org/presentationml/2006/main">
+  <p:cSld>
+    <p:spTree>
+      <p:nvGrpSpPr>
+        <p:cNvPr id="1" name=""/>
+        <p:cNvGrpSpPr/>
+        <p:nvPr/>
+      </p:nvGrpSpPr>
+      <p:grpSpPr>
+        <a:xfrm>
+          <a:off x="0" y="0"/>
+          <a:ext cx="0" cy="0"/>
+          <a:chOff x="0" y="0"/>
+          <a:chExt cx="0" cy="0"/>
+        </a:xfrm>
+      </p:grpSpPr>
+      <p:sp>
+        <p:nvSpPr>
+          <p:cNvPr id="2" name="Заголовок 1"/>
+          <p:cNvSpPr>
+            <a:spLocks noGrp="1"/>
+          </p:cNvSpPr>
+          <p:nvPr>
+            <p:ph type="title"/>
+          </p:nvPr>
+        </p:nvSpPr>
+        <p:spPr/>
+        <p:txBody>
+          <a:bodyPr/>
+          <a:lstStyle/>
+          <a:p>
+            <a:r>
+              <a:rPr lang="ru-RU" dirty="0" smtClean="0"/>
+              <a:t>Пример </a:t>
+            </a:r>
+            <a:r>
+              <a:rPr lang="en-US" dirty="0" err="1" smtClean="0"/>
+              <a:t>JavaCC</a:t>
+            </a:r>
+            <a:r>
+              <a:rPr lang="en-US" dirty="0" smtClean="0"/>
+              <a:t> </a:t>
+            </a:r>
+            <a:r>
+              <a:rPr lang="ru-RU" dirty="0" err="1" smtClean="0"/>
+              <a:t>парсеров</a:t>
+            </a:r>
+            <a:endParaRPr lang="ru-RU" dirty="0"/>
+          </a:p>
+        </p:txBody>
+      </p:sp>
+      <p:sp>
+        <p:nvSpPr>
+          <p:cNvPr id="3" name="Объект 2"/>
+          <p:cNvSpPr>
+            <a:spLocks noGrp="1"/>
+          </p:cNvSpPr>
+          <p:nvPr>
+            <p:ph sz="half" idx="1"/>
+          </p:nvPr>
+        </p:nvSpPr>
+        <p:spPr>
+          <a:xfrm>
+            <a:off x="609600" y="1600201"/>
+            <a:ext cx="11391056" cy="4493095"/>
+          </a:xfrm>
+        </p:spPr>
+        <p:txBody>
+          <a:bodyPr/>
+          <a:lstStyle/>
+          <a:p>
+            <a:r>
+              <a:rPr lang="ru-RU" dirty="0" smtClean="0"/>
+              <a:t>И тут я открываю </a:t>
+            </a:r>
+            <a:r>
+              <a:rPr lang="en-US" dirty="0" smtClean="0"/>
+              <a:t>IDE</a:t>
+            </a:r>
+            <a:r>
+              <a:rPr lang="ru-RU" dirty="0" smtClean="0"/>
+              <a:t>…</a:t>
+            </a:r>
+            <a:endParaRPr lang="ru-RU" dirty="0"/>
+          </a:p>
+        </p:txBody>
+      </p:sp>
+    </p:spTree>
+    <p:extLst>
+      <p:ext uri="{BB962C8B-B14F-4D97-AF65-F5344CB8AC3E}">
+        <p14:creationId xmlns:p14="http://schemas.microsoft.com/office/powerpoint/2010/main" val="3747036871"/>
+      </p:ext>
+    </p:extLst>
+  </p:cSld>
+  <p:clrMapOvr>
+    <a:masterClrMapping/>
+  </p:clrMapOvr>
+  <p:timing>
+    <p:tnLst>
+      <p:par>
+        <p:cTn id="1" dur="indefinite" restart="never" nodeType="tmRoot"/>
+      </p:par>
+    </p:tnLst>
+  </p:timing>
+</p:sld>
+</file>
+
+<file path=ppt/slides/slide25.xml><?xml version="1.0" encoding="utf-8"?>
 <p:sld xmlns:a="http://schemas.openxmlformats.org/drawingml/2006/main" xmlns:r="http://schemas.openxmlformats.org/officeDocument/2006/relationships" xmlns:p="http://schemas.openxmlformats.org/presentationml/2006/main">
   <p:cSld>
     <p:spTree>
@@ -7929,7 +8997,7 @@
 </p:sld>
 </file>
 
-<file path=ppt/slides/slide23.xml><?xml version="1.0" encoding="utf-8"?>
+<file path=ppt/slides/slide26.xml><?xml version="1.0" encoding="utf-8"?>
 <p:sld xmlns:a="http://schemas.openxmlformats.org/drawingml/2006/main" xmlns:r="http://schemas.openxmlformats.org/officeDocument/2006/relationships" xmlns:p="http://schemas.openxmlformats.org/presentationml/2006/main">
   <p:cSld>
     <p:spTree>
@@ -10426,6 +11494,15 @@
 </file>
 
 <file path=customXml/item1.xml><?xml version="1.0" encoding="utf-8"?>
+<?mso-contentType ?>
+<FormTemplates xmlns="http://schemas.microsoft.com/sharepoint/v3/contenttype/forms">
+  <Display>DocumentLibraryForm</Display>
+  <Edit>DocumentLibraryForm</Edit>
+  <New>DocumentLibraryForm</New>
+</FormTemplates>
+</file>
+
+<file path=customXml/item2.xml><?xml version="1.0" encoding="utf-8"?>
 <ct:contentTypeSchema xmlns:ct="http://schemas.microsoft.com/office/2006/metadata/contentType" xmlns:ma="http://schemas.microsoft.com/office/2006/metadata/properties/metaAttributes" ct:_="" ma:_="" ma:contentTypeName="Document" ma:contentTypeID="0x010100FDD0A616FCC4A346BF86A780EF639943" ma:contentTypeVersion="5" ma:contentTypeDescription="Create a new document." ma:contentTypeScope="" ma:versionID="4df69096c71565f11594c0d1067dc915">
   <xsd:schema xmlns:xsd="http://www.w3.org/2001/XMLSchema" xmlns:xs="http://www.w3.org/2001/XMLSchema" xmlns:p="http://schemas.microsoft.com/office/2006/metadata/properties" xmlns:ns2="316eaab8-1f7a-431f-93e9-d7b1e3f904e3" targetNamespace="http://schemas.microsoft.com/office/2006/metadata/properties" ma:root="true" ma:fieldsID="317fab521d95d4b113d8488359c93055" ns2:_="">
     <xsd:import namespace="316eaab8-1f7a-431f-93e9-d7b1e3f904e3"/>
@@ -10577,15 +11654,6 @@
 </ct:contentTypeSchema>
 </file>
 
-<file path=customXml/item2.xml><?xml version="1.0" encoding="utf-8"?>
-<?mso-contentType ?>
-<FormTemplates xmlns="http://schemas.microsoft.com/sharepoint/v3/contenttype/forms">
-  <Display>DocumentLibraryForm</Display>
-  <Edit>DocumentLibraryForm</Edit>
-  <New>DocumentLibraryForm</New>
-</FormTemplates>
-</file>
-
 <file path=customXml/item3.xml><?xml version="1.0" encoding="utf-8"?>
 <p:properties xmlns:p="http://schemas.microsoft.com/office/2006/metadata/properties" xmlns:xsi="http://www.w3.org/2001/XMLSchema-instance" xmlns:pc="http://schemas.microsoft.com/office/infopath/2007/PartnerControls">
   <documentManagement>
@@ -10597,6 +11665,14 @@
 </file>
 
 <file path=customXml/itemProps1.xml><?xml version="1.0" encoding="utf-8"?>
+<ds:datastoreItem xmlns:ds="http://schemas.openxmlformats.org/officeDocument/2006/customXml" ds:itemID="{BB531E80-CB1C-4E6F-BC52-828C64FCCF4F}">
+  <ds:schemaRefs>
+    <ds:schemaRef ds:uri="http://schemas.microsoft.com/sharepoint/v3/contenttype/forms"/>
+  </ds:schemaRefs>
+</ds:datastoreItem>
+</file>
+
+<file path=customXml/itemProps2.xml><?xml version="1.0" encoding="utf-8"?>
 <ds:datastoreItem xmlns:ds="http://schemas.openxmlformats.org/officeDocument/2006/customXml" ds:itemID="{7C5D0913-6134-42B5-8502-1BA4CC253A53}">
   <ds:schemaRefs>
     <ds:schemaRef ds:uri="http://schemas.microsoft.com/office/2006/metadata/contentType"/>
@@ -10610,14 +11686,6 @@
     <ds:schemaRef ds:uri="http://purl.org/dc/elements/1.1/"/>
     <ds:schemaRef ds:uri="http://purl.org/dc/terms/"/>
     <ds:schemaRef ds:uri="http://schemas.microsoft.com/internal/obd"/>
-  </ds:schemaRefs>
-</ds:datastoreItem>
-</file>
-
-<file path=customXml/itemProps2.xml><?xml version="1.0" encoding="utf-8"?>
-<ds:datastoreItem xmlns:ds="http://schemas.openxmlformats.org/officeDocument/2006/customXml" ds:itemID="{BB531E80-CB1C-4E6F-BC52-828C64FCCF4F}">
-  <ds:schemaRefs>
-    <ds:schemaRef ds:uri="http://schemas.microsoft.com/sharepoint/v3/contenttype/forms"/>
   </ds:schemaRefs>
 </ds:datastoreItem>
 </file>

</xml_diff>